<commit_message>
fix some wording and examples
</commit_message>
<xml_diff>
--- a/tasks8.pptx
+++ b/tasks8.pptx
@@ -216,7 +216,7 @@
           <a:p>
             <a:fld id="{60A1A0BD-27CC-4C52-B084-C7D29C3E6A60}" type="datetimeFigureOut">
               <a:rPr lang="en-GB" smtClean="0"/>
-              <a:t>04/09/2021</a:t>
+              <a:t>09/09/2021</a:t>
             </a:fld>
             <a:endParaRPr lang="en-GB"/>
           </a:p>
@@ -633,7 +633,7 @@
           <a:p>
             <a:fld id="{4C324CBA-B5F8-49E4-A74D-FDDDFCEF0F4B}" type="datetimeFigureOut">
               <a:rPr lang="en-GB" smtClean="0"/>
-              <a:t>04/09/2021</a:t>
+              <a:t>09/09/2021</a:t>
             </a:fld>
             <a:endParaRPr lang="en-GB"/>
           </a:p>
@@ -833,7 +833,7 @@
           <a:p>
             <a:fld id="{4C324CBA-B5F8-49E4-A74D-FDDDFCEF0F4B}" type="datetimeFigureOut">
               <a:rPr lang="en-GB" smtClean="0"/>
-              <a:t>04/09/2021</a:t>
+              <a:t>09/09/2021</a:t>
             </a:fld>
             <a:endParaRPr lang="en-GB"/>
           </a:p>
@@ -1043,7 +1043,7 @@
           <a:p>
             <a:fld id="{4C324CBA-B5F8-49E4-A74D-FDDDFCEF0F4B}" type="datetimeFigureOut">
               <a:rPr lang="en-GB" smtClean="0"/>
-              <a:t>04/09/2021</a:t>
+              <a:t>09/09/2021</a:t>
             </a:fld>
             <a:endParaRPr lang="en-GB"/>
           </a:p>
@@ -1243,7 +1243,7 @@
           <a:p>
             <a:fld id="{4C324CBA-B5F8-49E4-A74D-FDDDFCEF0F4B}" type="datetimeFigureOut">
               <a:rPr lang="en-GB" smtClean="0"/>
-              <a:t>04/09/2021</a:t>
+              <a:t>09/09/2021</a:t>
             </a:fld>
             <a:endParaRPr lang="en-GB"/>
           </a:p>
@@ -1519,7 +1519,7 @@
           <a:p>
             <a:fld id="{4C324CBA-B5F8-49E4-A74D-FDDDFCEF0F4B}" type="datetimeFigureOut">
               <a:rPr lang="en-GB" smtClean="0"/>
-              <a:t>04/09/2021</a:t>
+              <a:t>09/09/2021</a:t>
             </a:fld>
             <a:endParaRPr lang="en-GB"/>
           </a:p>
@@ -1787,7 +1787,7 @@
           <a:p>
             <a:fld id="{4C324CBA-B5F8-49E4-A74D-FDDDFCEF0F4B}" type="datetimeFigureOut">
               <a:rPr lang="en-GB" smtClean="0"/>
-              <a:t>04/09/2021</a:t>
+              <a:t>09/09/2021</a:t>
             </a:fld>
             <a:endParaRPr lang="en-GB"/>
           </a:p>
@@ -2202,7 +2202,7 @@
           <a:p>
             <a:fld id="{4C324CBA-B5F8-49E4-A74D-FDDDFCEF0F4B}" type="datetimeFigureOut">
               <a:rPr lang="en-GB" smtClean="0"/>
-              <a:t>04/09/2021</a:t>
+              <a:t>09/09/2021</a:t>
             </a:fld>
             <a:endParaRPr lang="en-GB"/>
           </a:p>
@@ -2344,7 +2344,7 @@
           <a:p>
             <a:fld id="{4C324CBA-B5F8-49E4-A74D-FDDDFCEF0F4B}" type="datetimeFigureOut">
               <a:rPr lang="en-GB" smtClean="0"/>
-              <a:t>04/09/2021</a:t>
+              <a:t>09/09/2021</a:t>
             </a:fld>
             <a:endParaRPr lang="en-GB"/>
           </a:p>
@@ -2457,7 +2457,7 @@
           <a:p>
             <a:fld id="{4C324CBA-B5F8-49E4-A74D-FDDDFCEF0F4B}" type="datetimeFigureOut">
               <a:rPr lang="en-GB" smtClean="0"/>
-              <a:t>04/09/2021</a:t>
+              <a:t>09/09/2021</a:t>
             </a:fld>
             <a:endParaRPr lang="en-GB"/>
           </a:p>
@@ -2770,7 +2770,7 @@
           <a:p>
             <a:fld id="{4C324CBA-B5F8-49E4-A74D-FDDDFCEF0F4B}" type="datetimeFigureOut">
               <a:rPr lang="en-GB" smtClean="0"/>
-              <a:t>04/09/2021</a:t>
+              <a:t>09/09/2021</a:t>
             </a:fld>
             <a:endParaRPr lang="en-GB"/>
           </a:p>
@@ -3059,7 +3059,7 @@
           <a:p>
             <a:fld id="{4C324CBA-B5F8-49E4-A74D-FDDDFCEF0F4B}" type="datetimeFigureOut">
               <a:rPr lang="en-GB" smtClean="0"/>
-              <a:t>04/09/2021</a:t>
+              <a:t>09/09/2021</a:t>
             </a:fld>
             <a:endParaRPr lang="en-GB"/>
           </a:p>
@@ -3304,7 +3304,7 @@
             <a:fld id="{4C324CBA-B5F8-49E4-A74D-FDDDFCEF0F4B}" type="datetimeFigureOut">
               <a:rPr lang="en-GB" smtClean="0"/>
               <a:pPr/>
-              <a:t>04/09/2021</a:t>
+              <a:t>09/09/2021</a:t>
             </a:fld>
             <a:endParaRPr lang="en-GB" dirty="0"/>
           </a:p>
@@ -6700,7 +6700,7 @@
         <p:spPr>
           <a:xfrm>
             <a:off x="516000" y="42472"/>
-            <a:ext cx="11340000" cy="6986528"/>
+            <a:ext cx="11340000" cy="7201972"/>
           </a:xfrm>
           <a:prstGeom prst="rect">
             <a:avLst/>
@@ -6818,7 +6818,7 @@
                 <a:ea typeface="+mj-ea"/>
                 <a:cs typeface="+mj-cs"/>
               </a:rPr>
-              <a:t> which encloses the last axis of its argument array, or the whole array if it is a vector:</a:t>
+              <a:t> which encloses the last axis of its argument array, or the whole array if it is a vector or scalar:</a:t>
             </a:r>
           </a:p>
           <a:p>
@@ -7744,7 +7744,41 @@
                 <a:ea typeface="+mj-ea"/>
                 <a:cs typeface="+mj-cs"/>
               </a:rPr>
-              <a:t>BONUS:</a:t>
+              <a:t>NOTE: </a:t>
+            </a:r>
+            <a:r>
+              <a:rPr kumimoji="0" lang="en-GB" sz="1400" i="0" u="none" strike="noStrike" kern="1200" cap="none" spc="0" normalizeH="0" baseline="0" noProof="0" dirty="0">
+                <a:ln>
+                  <a:noFill/>
+                </a:ln>
+                <a:solidFill>
+                  <a:prstClr val="black"/>
+                </a:solidFill>
+                <a:effectLst/>
+                <a:uLnTx/>
+                <a:uFillTx/>
+                <a:latin typeface="Atkinson Hyperlegible" pitchFamily="50" charset="0"/>
+                <a:ea typeface="+mj-ea"/>
+                <a:cs typeface="+mj-cs"/>
+              </a:rPr>
+              <a:t>Enclosing a simple scalar returns that scalar.</a:t>
+            </a:r>
+            <a:r>
+              <a:rPr kumimoji="0" lang="en-GB" sz="1400" b="1" i="0" u="none" strike="noStrike" kern="1200" cap="none" spc="0" normalizeH="0" baseline="0" noProof="0" dirty="0">
+                <a:ln>
+                  <a:noFill/>
+                </a:ln>
+                <a:solidFill>
+                  <a:prstClr val="black"/>
+                </a:solidFill>
+                <a:effectLst/>
+                <a:uLnTx/>
+                <a:uFillTx/>
+                <a:latin typeface="Atkinson Hyperlegible" pitchFamily="50" charset="0"/>
+                <a:ea typeface="+mj-ea"/>
+                <a:cs typeface="+mj-cs"/>
+              </a:rPr>
+              <a:t> BONUS:</a:t>
             </a:r>
             <a:r>
               <a:rPr kumimoji="0" lang="en-GB" sz="1400" i="0" u="none" strike="noStrike" kern="1200" cap="none" spc="0" normalizeH="0" baseline="0" noProof="0" dirty="0">
@@ -8663,7 +8697,7 @@
         <p:spPr>
           <a:xfrm>
             <a:off x="696000" y="729000"/>
-            <a:ext cx="10800000" cy="6370975"/>
+            <a:ext cx="10800000" cy="6278642"/>
           </a:xfrm>
           <a:prstGeom prst="rect">
             <a:avLst/>
@@ -8750,7 +8784,7 @@
               <a:t>Create a function </a:t>
             </a:r>
             <a:r>
-              <a:rPr lang="en-GB" sz="2400" dirty="0" err="1">
+              <a:rPr lang="en-GB" sz="2400" dirty="0">
                 <a:solidFill>
                   <a:prstClr val="black"/>
                 </a:solidFill>
@@ -8776,7 +8810,206 @@
             <a:pPr marL="0" indent="0">
               <a:buNone/>
             </a:pPr>
-            <a:endParaRPr kumimoji="0" lang="en-GB" sz="2400" i="0" u="none" strike="noStrike" kern="1200" cap="none" spc="0" normalizeH="0" baseline="0" noProof="0" dirty="0">
+            <a:r>
+              <a:rPr lang="en-GB" sz="1700" dirty="0">
+                <a:solidFill>
+                  <a:prstClr val="black"/>
+                </a:solidFill>
+                <a:latin typeface="APL385 Unicode" panose="020B0709000202000203" pitchFamily="49" charset="0"/>
+                <a:ea typeface="+mj-ea"/>
+                <a:cs typeface="+mj-cs"/>
+              </a:rPr>
+              <a:t>      ]display </a:t>
+            </a:r>
+            <a:r>
+              <a:rPr lang="en-GB" sz="1700" dirty="0" err="1">
+                <a:solidFill>
+                  <a:prstClr val="black"/>
+                </a:solidFill>
+                <a:latin typeface="APL385 Unicode" panose="020B0709000202000203" pitchFamily="49" charset="0"/>
+                <a:ea typeface="+mj-ea"/>
+                <a:cs typeface="+mj-cs"/>
+              </a:rPr>
+              <a:t>NumLists</a:t>
+            </a:r>
+            <a:r>
+              <a:rPr lang="en-GB" sz="1700" dirty="0">
+                <a:solidFill>
+                  <a:prstClr val="black"/>
+                </a:solidFill>
+                <a:latin typeface="APL385 Unicode" panose="020B0709000202000203" pitchFamily="49" charset="0"/>
+                <a:ea typeface="+mj-ea"/>
+                <a:cs typeface="+mj-cs"/>
+              </a:rPr>
+              <a:t> '42'</a:t>
+            </a:r>
+          </a:p>
+          <a:p>
+            <a:pPr marL="0" indent="0">
+              <a:buNone/>
+            </a:pPr>
+            <a:r>
+              <a:rPr lang="en-GB" sz="1700" dirty="0">
+                <a:solidFill>
+                  <a:prstClr val="black"/>
+                </a:solidFill>
+                <a:latin typeface="APL385 Unicode" panose="020B0709000202000203" pitchFamily="49" charset="0"/>
+                <a:ea typeface="+mj-ea"/>
+                <a:cs typeface="+mj-cs"/>
+              </a:rPr>
+              <a:t>┌→─┐</a:t>
+            </a:r>
+          </a:p>
+          <a:p>
+            <a:pPr marL="0" indent="0">
+              <a:buNone/>
+            </a:pPr>
+            <a:r>
+              <a:rPr lang="en-GB" sz="1700" dirty="0">
+                <a:solidFill>
+                  <a:prstClr val="black"/>
+                </a:solidFill>
+                <a:latin typeface="APL385 Unicode" panose="020B0709000202000203" pitchFamily="49" charset="0"/>
+                <a:ea typeface="+mj-ea"/>
+                <a:cs typeface="+mj-cs"/>
+              </a:rPr>
+              <a:t>│42│</a:t>
+            </a:r>
+          </a:p>
+          <a:p>
+            <a:pPr marL="0" indent="0">
+              <a:buNone/>
+            </a:pPr>
+            <a:r>
+              <a:rPr lang="en-GB" sz="1700" dirty="0">
+                <a:solidFill>
+                  <a:prstClr val="black"/>
+                </a:solidFill>
+                <a:latin typeface="APL385 Unicode" panose="020B0709000202000203" pitchFamily="49" charset="0"/>
+                <a:ea typeface="+mj-ea"/>
+                <a:cs typeface="+mj-cs"/>
+              </a:rPr>
+              <a:t>└~─┘</a:t>
+            </a:r>
+          </a:p>
+          <a:p>
+            <a:pPr marL="0" indent="0">
+              <a:buNone/>
+            </a:pPr>
+            <a:r>
+              <a:rPr lang="en-GB" sz="1700" dirty="0">
+                <a:solidFill>
+                  <a:prstClr val="black"/>
+                </a:solidFill>
+                <a:latin typeface="APL385 Unicode" panose="020B0709000202000203" pitchFamily="49" charset="0"/>
+                <a:ea typeface="+mj-ea"/>
+                <a:cs typeface="+mj-cs"/>
+              </a:rPr>
+              <a:t>      ]display </a:t>
+            </a:r>
+            <a:r>
+              <a:rPr lang="en-GB" sz="1700" dirty="0" err="1">
+                <a:solidFill>
+                  <a:prstClr val="black"/>
+                </a:solidFill>
+                <a:latin typeface="APL385 Unicode" panose="020B0709000202000203" pitchFamily="49" charset="0"/>
+                <a:ea typeface="+mj-ea"/>
+                <a:cs typeface="+mj-cs"/>
+              </a:rPr>
+              <a:t>NumLists</a:t>
+            </a:r>
+            <a:r>
+              <a:rPr lang="en-GB" sz="1700" dirty="0">
+                <a:solidFill>
+                  <a:prstClr val="black"/>
+                </a:solidFill>
+                <a:latin typeface="APL385 Unicode" panose="020B0709000202000203" pitchFamily="49" charset="0"/>
+                <a:ea typeface="+mj-ea"/>
+                <a:cs typeface="+mj-cs"/>
+              </a:rPr>
+              <a:t> '3'</a:t>
+            </a:r>
+          </a:p>
+          <a:p>
+            <a:pPr marL="0" indent="0">
+              <a:buNone/>
+            </a:pPr>
+            <a:r>
+              <a:rPr lang="en-GB" sz="1700" dirty="0">
+                <a:solidFill>
+                  <a:prstClr val="black"/>
+                </a:solidFill>
+                <a:latin typeface="APL385 Unicode" panose="020B0709000202000203" pitchFamily="49" charset="0"/>
+                <a:ea typeface="+mj-ea"/>
+                <a:cs typeface="+mj-cs"/>
+              </a:rPr>
+              <a:t>┌→┐</a:t>
+            </a:r>
+          </a:p>
+          <a:p>
+            <a:pPr marL="0" indent="0">
+              <a:buNone/>
+            </a:pPr>
+            <a:r>
+              <a:rPr lang="en-GB" sz="1700" dirty="0">
+                <a:solidFill>
+                  <a:prstClr val="black"/>
+                </a:solidFill>
+                <a:latin typeface="APL385 Unicode" panose="020B0709000202000203" pitchFamily="49" charset="0"/>
+                <a:ea typeface="+mj-ea"/>
+                <a:cs typeface="+mj-cs"/>
+              </a:rPr>
+              <a:t>│3│</a:t>
+            </a:r>
+          </a:p>
+          <a:p>
+            <a:pPr marL="0" indent="0">
+              <a:buNone/>
+            </a:pPr>
+            <a:r>
+              <a:rPr lang="en-GB" sz="1700" dirty="0">
+                <a:solidFill>
+                  <a:prstClr val="black"/>
+                </a:solidFill>
+                <a:latin typeface="APL385 Unicode" panose="020B0709000202000203" pitchFamily="49" charset="0"/>
+                <a:ea typeface="+mj-ea"/>
+                <a:cs typeface="+mj-cs"/>
+              </a:rPr>
+              <a:t>└~┘</a:t>
+            </a:r>
+          </a:p>
+          <a:p>
+            <a:pPr marL="0" indent="0">
+              <a:buNone/>
+            </a:pPr>
+            <a:r>
+              <a:rPr lang="en-GB" sz="1700" dirty="0">
+                <a:solidFill>
+                  <a:prstClr val="black"/>
+                </a:solidFill>
+                <a:latin typeface="APL385 Unicode" panose="020B0709000202000203" pitchFamily="49" charset="0"/>
+                <a:ea typeface="+mj-ea"/>
+                <a:cs typeface="+mj-cs"/>
+              </a:rPr>
+              <a:t>      +/ NumList '12,14 ¯3 55'</a:t>
+            </a:r>
+          </a:p>
+          <a:p>
+            <a:pPr marL="0" indent="0">
+              <a:buNone/>
+            </a:pPr>
+            <a:r>
+              <a:rPr lang="en-GB" sz="1700" dirty="0">
+                <a:solidFill>
+                  <a:prstClr val="black"/>
+                </a:solidFill>
+                <a:latin typeface="APL385 Unicode" panose="020B0709000202000203" pitchFamily="49" charset="0"/>
+                <a:ea typeface="+mj-ea"/>
+                <a:cs typeface="+mj-cs"/>
+              </a:rPr>
+              <a:t>78 </a:t>
+            </a:r>
+            <a:endParaRPr kumimoji="0" lang="en-GB" sz="1700" i="0" u="none" strike="noStrike" kern="1200" cap="none" spc="0" normalizeH="0" baseline="0" noProof="0" dirty="0">
               <a:ln>
                 <a:noFill/>
               </a:ln>
@@ -8786,7 +9019,7 @@
               <a:effectLst/>
               <a:uLnTx/>
               <a:uFillTx/>
-              <a:latin typeface="Atkinson Hyperlegible" pitchFamily="50" charset="0"/>
+              <a:latin typeface="APL385 Unicode" panose="020B0709000202000203" pitchFamily="49" charset="0"/>
               <a:ea typeface="+mj-ea"/>
               <a:cs typeface="+mj-cs"/>
             </a:endParaRPr>
@@ -8796,185 +9029,29 @@
               <a:buNone/>
             </a:pPr>
             <a:r>
-              <a:rPr kumimoji="0" lang="en-GB" sz="2400" i="0" u="none" strike="noStrike" kern="1200" cap="none" spc="0" normalizeH="0" baseline="0" noProof="0" dirty="0">
-                <a:ln>
-                  <a:noFill/>
-                </a:ln>
-                <a:solidFill>
-                  <a:prstClr val="black"/>
-                </a:solidFill>
-                <a:effectLst/>
-                <a:uLnTx/>
-                <a:uFillTx/>
-                <a:latin typeface="APL385 Unicode" panose="020B0709000202000203" pitchFamily="49" charset="0"/>
-                <a:ea typeface="+mj-ea"/>
-                <a:cs typeface="+mj-cs"/>
-              </a:rPr>
-              <a:t>      ]display </a:t>
-            </a:r>
-            <a:r>
-              <a:rPr kumimoji="0" lang="en-GB" sz="2400" i="0" u="none" strike="noStrike" kern="1200" cap="none" spc="0" normalizeH="0" baseline="0" noProof="0" dirty="0" err="1">
-                <a:ln>
-                  <a:noFill/>
-                </a:ln>
-                <a:solidFill>
-                  <a:prstClr val="black"/>
-                </a:solidFill>
-                <a:effectLst/>
-                <a:uLnTx/>
-                <a:uFillTx/>
-                <a:latin typeface="APL385 Unicode" panose="020B0709000202000203" pitchFamily="49" charset="0"/>
-                <a:ea typeface="+mj-ea"/>
-                <a:cs typeface="+mj-cs"/>
-              </a:rPr>
-              <a:t>NumList</a:t>
-            </a:r>
-            <a:r>
-              <a:rPr kumimoji="0" lang="en-GB" sz="2400" i="0" u="none" strike="noStrike" kern="1200" cap="none" spc="0" normalizeH="0" baseline="0" noProof="0" dirty="0">
-                <a:ln>
-                  <a:noFill/>
-                </a:ln>
-                <a:solidFill>
-                  <a:prstClr val="black"/>
-                </a:solidFill>
-                <a:effectLst/>
-                <a:uLnTx/>
-                <a:uFillTx/>
-                <a:latin typeface="APL385 Unicode" panose="020B0709000202000203" pitchFamily="49" charset="0"/>
-                <a:ea typeface="+mj-ea"/>
-                <a:cs typeface="+mj-cs"/>
-              </a:rPr>
-              <a:t> '42'</a:t>
-            </a:r>
-          </a:p>
-          <a:p>
-            <a:pPr marL="0" indent="0">
-              <a:buNone/>
-            </a:pPr>
-            <a:r>
-              <a:rPr kumimoji="0" lang="en-GB" sz="2400" i="0" u="none" strike="noStrike" kern="1200" cap="none" spc="0" normalizeH="0" baseline="0" noProof="0" dirty="0">
-                <a:ln>
-                  <a:noFill/>
-                </a:ln>
-                <a:solidFill>
-                  <a:prstClr val="black"/>
-                </a:solidFill>
-                <a:effectLst/>
-                <a:uLnTx/>
-                <a:uFillTx/>
-                <a:latin typeface="APL385 Unicode" panose="020B0709000202000203" pitchFamily="49" charset="0"/>
-                <a:ea typeface="+mj-ea"/>
-                <a:cs typeface="+mj-cs"/>
-              </a:rPr>
-              <a:t>┌→─┐</a:t>
-            </a:r>
-          </a:p>
-          <a:p>
-            <a:pPr marL="0" indent="0">
-              <a:buNone/>
-            </a:pPr>
-            <a:r>
-              <a:rPr kumimoji="0" lang="en-GB" sz="2400" i="0" u="none" strike="noStrike" kern="1200" cap="none" spc="0" normalizeH="0" baseline="0" noProof="0" dirty="0">
-                <a:ln>
-                  <a:noFill/>
-                </a:ln>
-                <a:solidFill>
-                  <a:prstClr val="black"/>
-                </a:solidFill>
-                <a:effectLst/>
-                <a:uLnTx/>
-                <a:uFillTx/>
-                <a:latin typeface="APL385 Unicode" panose="020B0709000202000203" pitchFamily="49" charset="0"/>
-                <a:ea typeface="+mj-ea"/>
-                <a:cs typeface="+mj-cs"/>
-              </a:rPr>
-              <a:t>│42│</a:t>
-            </a:r>
-          </a:p>
-          <a:p>
-            <a:pPr marL="0" indent="0">
-              <a:buNone/>
-            </a:pPr>
-            <a:r>
-              <a:rPr kumimoji="0" lang="en-GB" sz="2400" i="0" u="none" strike="noStrike" kern="1200" cap="none" spc="0" normalizeH="0" baseline="0" noProof="0" dirty="0">
-                <a:ln>
-                  <a:noFill/>
-                </a:ln>
-                <a:solidFill>
-                  <a:prstClr val="black"/>
-                </a:solidFill>
-                <a:effectLst/>
-                <a:uLnTx/>
-                <a:uFillTx/>
-                <a:latin typeface="APL385 Unicode" panose="020B0709000202000203" pitchFamily="49" charset="0"/>
-                <a:ea typeface="+mj-ea"/>
-                <a:cs typeface="+mj-cs"/>
-              </a:rPr>
-              <a:t>└~─┘</a:t>
-            </a:r>
-          </a:p>
-          <a:p>
-            <a:pPr marL="0" indent="0">
-              <a:buNone/>
-            </a:pPr>
-            <a:r>
-              <a:rPr kumimoji="0" lang="en-GB" sz="2400" i="0" u="none" strike="noStrike" kern="1200" cap="none" spc="0" normalizeH="0" baseline="0" noProof="0" dirty="0">
-                <a:ln>
-                  <a:noFill/>
-                </a:ln>
-                <a:solidFill>
-                  <a:prstClr val="black"/>
-                </a:solidFill>
-                <a:effectLst/>
-                <a:uLnTx/>
-                <a:uFillTx/>
-                <a:latin typeface="APL385 Unicode" panose="020B0709000202000203" pitchFamily="49" charset="0"/>
-                <a:ea typeface="+mj-ea"/>
-                <a:cs typeface="+mj-cs"/>
-              </a:rPr>
-              <a:t>      ]display </a:t>
-            </a:r>
-            <a:r>
-              <a:rPr kumimoji="0" lang="en-GB" sz="2400" i="0" u="none" strike="noStrike" kern="1200" cap="none" spc="0" normalizeH="0" baseline="0" noProof="0" dirty="0" err="1">
-                <a:ln>
-                  <a:noFill/>
-                </a:ln>
-                <a:solidFill>
-                  <a:prstClr val="black"/>
-                </a:solidFill>
-                <a:effectLst/>
-                <a:uLnTx/>
-                <a:uFillTx/>
-                <a:latin typeface="APL385 Unicode" panose="020B0709000202000203" pitchFamily="49" charset="0"/>
-                <a:ea typeface="+mj-ea"/>
-                <a:cs typeface="+mj-cs"/>
-              </a:rPr>
-              <a:t>NumList</a:t>
-            </a:r>
-            <a:r>
-              <a:rPr kumimoji="0" lang="en-GB" sz="2400" i="0" u="none" strike="noStrike" kern="1200" cap="none" spc="0" normalizeH="0" baseline="0" noProof="0" dirty="0">
-                <a:ln>
-                  <a:noFill/>
-                </a:ln>
-                <a:solidFill>
-                  <a:prstClr val="black"/>
-                </a:solidFill>
-                <a:effectLst/>
-                <a:uLnTx/>
-                <a:uFillTx/>
-                <a:latin typeface="APL385 Unicode" panose="020B0709000202000203" pitchFamily="49" charset="0"/>
-                <a:ea typeface="+mj-ea"/>
-                <a:cs typeface="+mj-cs"/>
-              </a:rPr>
-              <a:t> '1 3 4 5'</a:t>
-            </a:r>
-          </a:p>
-          <a:p>
-            <a:pPr marL="0" indent="0">
-              <a:buNone/>
-            </a:pPr>
-            <a:r>
-              <a:rPr kumimoji="0" lang="en-GB" sz="2400" i="0" u="none" strike="noStrike" kern="1200" cap="none" spc="0" normalizeH="0" baseline="0" noProof="0" dirty="0">
+              <a:rPr kumimoji="0" lang="en-GB" sz="1700" i="0" u="none" strike="noStrike" kern="1200" cap="none" spc="0" normalizeH="0" baseline="0" noProof="0" dirty="0">
+                <a:ln>
+                  <a:noFill/>
+                </a:ln>
+                <a:solidFill>
+                  <a:prstClr val="black"/>
+                </a:solidFill>
+                <a:effectLst/>
+                <a:uLnTx/>
+                <a:uFillTx/>
+                <a:latin typeface="APL385 Unicode" panose="020B0709000202000203" pitchFamily="49" charset="0"/>
+                <a:ea typeface="+mj-ea"/>
+                <a:cs typeface="+mj-cs"/>
+              </a:rPr>
+              <a:t>      ]display NumList '1 3 4 5'</a:t>
+            </a:r>
+          </a:p>
+          <a:p>
+            <a:pPr marL="0" indent="0">
+              <a:buNone/>
+            </a:pPr>
+            <a:r>
+              <a:rPr kumimoji="0" lang="en-GB" sz="1700" i="0" u="none" strike="noStrike" kern="1200" cap="none" spc="0" normalizeH="0" baseline="0" noProof="0" dirty="0">
                 <a:ln>
                   <a:noFill/>
                 </a:ln>
@@ -8996,7 +9073,7 @@
               <a:buNone/>
             </a:pPr>
             <a:r>
-              <a:rPr kumimoji="0" lang="en-GB" sz="2400" i="0" u="none" strike="noStrike" kern="1200" cap="none" spc="0" normalizeH="0" baseline="0" noProof="0" dirty="0">
+              <a:rPr kumimoji="0" lang="en-GB" sz="1700" i="0" u="none" strike="noStrike" kern="1200" cap="none" spc="0" normalizeH="0" baseline="0" noProof="0" dirty="0">
                 <a:ln>
                   <a:noFill/>
                 </a:ln>
@@ -9018,7 +9095,7 @@
               <a:buNone/>
             </a:pPr>
             <a:r>
-              <a:rPr kumimoji="0" lang="en-GB" sz="2400" i="0" u="none" strike="noStrike" kern="1200" cap="none" spc="0" normalizeH="0" baseline="0" noProof="0" dirty="0">
+              <a:rPr kumimoji="0" lang="en-GB" sz="1700" i="0" u="none" strike="noStrike" kern="1200" cap="none" spc="0" normalizeH="0" baseline="0" noProof="0" dirty="0">
                 <a:ln>
                   <a:noFill/>
                 </a:ln>
@@ -9040,63 +9117,29 @@
               <a:buNone/>
             </a:pPr>
             <a:r>
-              <a:rPr kumimoji="0" lang="en-GB" sz="2400" i="0" u="none" strike="noStrike" kern="1200" cap="none" spc="0" normalizeH="0" baseline="0" noProof="0" dirty="0">
-                <a:ln>
-                  <a:noFill/>
-                </a:ln>
-                <a:solidFill>
-                  <a:prstClr val="black"/>
-                </a:solidFill>
-                <a:effectLst/>
-                <a:uLnTx/>
-                <a:uFillTx/>
-                <a:latin typeface="APL385 Unicode" panose="020B0709000202000203" pitchFamily="49" charset="0"/>
-                <a:ea typeface="+mj-ea"/>
-                <a:cs typeface="+mj-cs"/>
-              </a:rPr>
-              <a:t>      ]display </a:t>
-            </a:r>
-            <a:r>
-              <a:rPr kumimoji="0" lang="en-GB" sz="2400" i="0" u="none" strike="noStrike" kern="1200" cap="none" spc="0" normalizeH="0" baseline="0" noProof="0" dirty="0" err="1">
-                <a:ln>
-                  <a:noFill/>
-                </a:ln>
-                <a:solidFill>
-                  <a:prstClr val="black"/>
-                </a:solidFill>
-                <a:effectLst/>
-                <a:uLnTx/>
-                <a:uFillTx/>
-                <a:latin typeface="APL385 Unicode" panose="020B0709000202000203" pitchFamily="49" charset="0"/>
-                <a:ea typeface="+mj-ea"/>
-                <a:cs typeface="+mj-cs"/>
-              </a:rPr>
-              <a:t>NumList</a:t>
-            </a:r>
-            <a:r>
-              <a:rPr kumimoji="0" lang="en-GB" sz="2400" i="0" u="none" strike="noStrike" kern="1200" cap="none" spc="0" normalizeH="0" baseline="0" noProof="0" dirty="0">
-                <a:ln>
-                  <a:noFill/>
-                </a:ln>
-                <a:solidFill>
-                  <a:prstClr val="black"/>
-                </a:solidFill>
-                <a:effectLst/>
-                <a:uLnTx/>
-                <a:uFillTx/>
-                <a:latin typeface="APL385 Unicode" panose="020B0709000202000203" pitchFamily="49" charset="0"/>
-                <a:ea typeface="+mj-ea"/>
-                <a:cs typeface="+mj-cs"/>
-              </a:rPr>
-              <a:t> '12,23 5 4 3,6,2,15'</a:t>
-            </a:r>
-          </a:p>
-          <a:p>
-            <a:pPr marL="0" indent="0">
-              <a:buNone/>
-            </a:pPr>
-            <a:r>
-              <a:rPr kumimoji="0" lang="en-GB" sz="2400" i="0" u="none" strike="noStrike" kern="1200" cap="none" spc="0" normalizeH="0" baseline="0" noProof="0" dirty="0">
+              <a:rPr kumimoji="0" lang="en-GB" sz="1700" i="0" u="none" strike="noStrike" kern="1200" cap="none" spc="0" normalizeH="0" baseline="0" noProof="0" dirty="0">
+                <a:ln>
+                  <a:noFill/>
+                </a:ln>
+                <a:solidFill>
+                  <a:prstClr val="black"/>
+                </a:solidFill>
+                <a:effectLst/>
+                <a:uLnTx/>
+                <a:uFillTx/>
+                <a:latin typeface="APL385 Unicode" panose="020B0709000202000203" pitchFamily="49" charset="0"/>
+                <a:ea typeface="+mj-ea"/>
+                <a:cs typeface="+mj-cs"/>
+              </a:rPr>
+              <a:t>      ]display NumList '12,23 5 4 3,6,2,15'</a:t>
+            </a:r>
+          </a:p>
+          <a:p>
+            <a:pPr marL="0" indent="0">
+              <a:buNone/>
+            </a:pPr>
+            <a:r>
+              <a:rPr kumimoji="0" lang="en-GB" sz="1700" i="0" u="none" strike="noStrike" kern="1200" cap="none" spc="0" normalizeH="0" baseline="0" noProof="0" dirty="0">
                 <a:ln>
                   <a:noFill/>
                 </a:ln>
@@ -9118,7 +9161,7 @@
               <a:buNone/>
             </a:pPr>
             <a:r>
-              <a:rPr kumimoji="0" lang="en-GB" sz="2400" i="0" u="none" strike="noStrike" kern="1200" cap="none" spc="0" normalizeH="0" baseline="0" noProof="0" dirty="0">
+              <a:rPr kumimoji="0" lang="en-GB" sz="1700" i="0" u="none" strike="noStrike" kern="1200" cap="none" spc="0" normalizeH="0" baseline="0" noProof="0" dirty="0">
                 <a:ln>
                   <a:noFill/>
                 </a:ln>
@@ -9140,7 +9183,7 @@
               <a:buNone/>
             </a:pPr>
             <a:r>
-              <a:rPr kumimoji="0" lang="en-GB" sz="2400" i="0" u="none" strike="noStrike" kern="1200" cap="none" spc="0" normalizeH="0" baseline="0" noProof="0" dirty="0">
+              <a:rPr kumimoji="0" lang="en-GB" sz="1700" i="0" u="none" strike="noStrike" kern="1200" cap="none" spc="0" normalizeH="0" baseline="0" noProof="0" dirty="0">
                 <a:ln>
                   <a:noFill/>
                 </a:ln>
@@ -9667,7 +9710,7 @@
         <p:spPr>
           <a:xfrm>
             <a:off x="696000" y="369000"/>
-            <a:ext cx="10800000" cy="6001643"/>
+            <a:ext cx="10800000" cy="6617196"/>
           </a:xfrm>
           <a:prstGeom prst="rect">
             <a:avLst/>
@@ -9792,7 +9835,7 @@
             <a:pPr marL="0" indent="0">
               <a:buNone/>
             </a:pPr>
-            <a:endParaRPr kumimoji="0" lang="en-GB" sz="2400" i="0" u="none" strike="noStrike" kern="1200" cap="none" spc="0" normalizeH="0" baseline="0" noProof="0" dirty="0">
+            <a:endParaRPr kumimoji="0" lang="en-GB" sz="2000" i="0" u="none" strike="noStrike" kern="1200" cap="none" spc="0" normalizeH="0" baseline="0" noProof="0" dirty="0">
               <a:ln>
                 <a:noFill/>
               </a:ln>
@@ -9812,7 +9855,7 @@
               <a:buNone/>
             </a:pPr>
             <a:r>
-              <a:rPr kumimoji="0" lang="en-GB" sz="2400" i="0" u="none" strike="noStrike" kern="1200" cap="none" spc="0" normalizeH="0" baseline="0" noProof="0" dirty="0">
+              <a:rPr kumimoji="0" lang="en-GB" sz="2000" i="0" u="none" strike="noStrike" kern="1200" cap="none" spc="0" normalizeH="0" baseline="0" noProof="0" dirty="0">
                 <a:ln>
                   <a:noFill/>
                 </a:ln>
@@ -9829,7 +9872,7 @@
               <a:t>      ]display </a:t>
             </a:r>
             <a:r>
-              <a:rPr kumimoji="0" lang="en-GB" sz="2400" i="0" u="none" strike="noStrike" kern="1200" cap="none" spc="0" normalizeH="0" baseline="0" noProof="0" dirty="0" err="1">
+              <a:rPr kumimoji="0" lang="en-GB" sz="2000" i="0" u="none" strike="noStrike" kern="1200" cap="none" spc="0" normalizeH="0" baseline="0" noProof="0" dirty="0" err="1">
                 <a:ln>
                   <a:noFill/>
                 </a:ln>
@@ -9846,7 +9889,7 @@
               <a:t>NumLists</a:t>
             </a:r>
             <a:r>
-              <a:rPr kumimoji="0" lang="en-GB" sz="2400" i="0" u="none" strike="noStrike" kern="1200" cap="none" spc="0" normalizeH="0" baseline="0" noProof="0" dirty="0">
+              <a:rPr kumimoji="0" lang="en-GB" sz="2000" i="0" u="none" strike="noStrike" kern="1200" cap="none" spc="0" normalizeH="0" baseline="0" noProof="0" dirty="0">
                 <a:ln>
                   <a:noFill/>
                 </a:ln>
@@ -9868,7 +9911,7 @@
               <a:buNone/>
             </a:pPr>
             <a:r>
-              <a:rPr kumimoji="0" lang="en-GB" sz="2400" i="0" u="none" strike="noStrike" kern="1200" cap="none" spc="0" normalizeH="0" baseline="0" noProof="0" dirty="0">
+              <a:rPr kumimoji="0" lang="en-GB" sz="2000" i="0" u="none" strike="noStrike" kern="1200" cap="none" spc="0" normalizeH="0" baseline="0" noProof="0" dirty="0">
                 <a:ln>
                   <a:noFill/>
                 </a:ln>
@@ -9890,7 +9933,7 @@
               <a:buNone/>
             </a:pPr>
             <a:r>
-              <a:rPr kumimoji="0" lang="en-GB" sz="2400" i="0" u="none" strike="noStrike" kern="1200" cap="none" spc="0" normalizeH="0" baseline="0" noProof="0" dirty="0">
+              <a:rPr kumimoji="0" lang="en-GB" sz="2000" i="0" u="none" strike="noStrike" kern="1200" cap="none" spc="0" normalizeH="0" baseline="0" noProof="0" dirty="0">
                 <a:ln>
                   <a:noFill/>
                 </a:ln>
@@ -9912,7 +9955,7 @@
               <a:buNone/>
             </a:pPr>
             <a:r>
-              <a:rPr kumimoji="0" lang="en-GB" sz="2400" i="0" u="none" strike="noStrike" kern="1200" cap="none" spc="0" normalizeH="0" baseline="0" noProof="0" dirty="0">
+              <a:rPr kumimoji="0" lang="en-GB" sz="2000" i="0" u="none" strike="noStrike" kern="1200" cap="none" spc="0" normalizeH="0" baseline="0" noProof="0" dirty="0">
                 <a:ln>
                   <a:noFill/>
                 </a:ln>
@@ -9934,16 +9977,10 @@
               <a:buNone/>
             </a:pPr>
             <a:r>
-              <a:rPr kumimoji="0" lang="en-GB" sz="2400" i="0" u="none" strike="noStrike" kern="1200" cap="none" spc="0" normalizeH="0" baseline="0" noProof="0" dirty="0">
-                <a:ln>
-                  <a:noFill/>
-                </a:ln>
-                <a:solidFill>
-                  <a:prstClr val="black"/>
-                </a:solidFill>
-                <a:effectLst/>
-                <a:uLnTx/>
-                <a:uFillTx/>
+              <a:rPr lang="en-GB" sz="2000" dirty="0">
+                <a:solidFill>
+                  <a:prstClr val="black"/>
+                </a:solidFill>
                 <a:latin typeface="APL385 Unicode" panose="020B0709000202000203" pitchFamily="49" charset="0"/>
                 <a:ea typeface="+mj-ea"/>
                 <a:cs typeface="+mj-cs"/>
@@ -9951,16 +9988,10 @@
               <a:t>      ]display </a:t>
             </a:r>
             <a:r>
-              <a:rPr kumimoji="0" lang="en-GB" sz="2400" i="0" u="none" strike="noStrike" kern="1200" cap="none" spc="0" normalizeH="0" baseline="0" noProof="0" dirty="0" err="1">
-                <a:ln>
-                  <a:noFill/>
-                </a:ln>
-                <a:solidFill>
-                  <a:prstClr val="black"/>
-                </a:solidFill>
-                <a:effectLst/>
-                <a:uLnTx/>
-                <a:uFillTx/>
+              <a:rPr lang="en-GB" sz="2000" dirty="0" err="1">
+                <a:solidFill>
+                  <a:prstClr val="black"/>
+                </a:solidFill>
                 <a:latin typeface="APL385 Unicode" panose="020B0709000202000203" pitchFamily="49" charset="0"/>
                 <a:ea typeface="+mj-ea"/>
                 <a:cs typeface="+mj-cs"/>
@@ -9968,7 +9999,123 @@
               <a:t>NumLists</a:t>
             </a:r>
             <a:r>
-              <a:rPr kumimoji="0" lang="en-GB" sz="2400" i="0" u="none" strike="noStrike" kern="1200" cap="none" spc="0" normalizeH="0" baseline="0" noProof="0" dirty="0">
+              <a:rPr lang="en-GB" sz="2000" dirty="0">
+                <a:solidFill>
+                  <a:prstClr val="black"/>
+                </a:solidFill>
+                <a:latin typeface="APL385 Unicode" panose="020B0709000202000203" pitchFamily="49" charset="0"/>
+                <a:ea typeface="+mj-ea"/>
+                <a:cs typeface="+mj-cs"/>
+              </a:rPr>
+              <a:t> '3'</a:t>
+            </a:r>
+          </a:p>
+          <a:p>
+            <a:pPr marL="0" indent="0">
+              <a:buNone/>
+            </a:pPr>
+            <a:r>
+              <a:rPr kumimoji="0" lang="en-GB" sz="2000" i="0" u="none" strike="noStrike" kern="1200" cap="none" spc="0" normalizeH="0" baseline="0" noProof="0" dirty="0">
+                <a:ln>
+                  <a:noFill/>
+                </a:ln>
+                <a:solidFill>
+                  <a:prstClr val="black"/>
+                </a:solidFill>
+                <a:effectLst/>
+                <a:uLnTx/>
+                <a:uFillTx/>
+                <a:latin typeface="APL385 Unicode" panose="020B0709000202000203" pitchFamily="49" charset="0"/>
+                <a:ea typeface="+mj-ea"/>
+                <a:cs typeface="+mj-cs"/>
+              </a:rPr>
+              <a:t>┌→┐</a:t>
+            </a:r>
+          </a:p>
+          <a:p>
+            <a:pPr marL="0" indent="0">
+              <a:buNone/>
+            </a:pPr>
+            <a:r>
+              <a:rPr kumimoji="0" lang="en-GB" sz="2000" i="0" u="none" strike="noStrike" kern="1200" cap="none" spc="0" normalizeH="0" baseline="0" noProof="0" dirty="0">
+                <a:ln>
+                  <a:noFill/>
+                </a:ln>
+                <a:solidFill>
+                  <a:prstClr val="black"/>
+                </a:solidFill>
+                <a:effectLst/>
+                <a:uLnTx/>
+                <a:uFillTx/>
+                <a:latin typeface="APL385 Unicode" panose="020B0709000202000203" pitchFamily="49" charset="0"/>
+                <a:ea typeface="+mj-ea"/>
+                <a:cs typeface="+mj-cs"/>
+              </a:rPr>
+              <a:t>│3│</a:t>
+            </a:r>
+          </a:p>
+          <a:p>
+            <a:pPr marL="0" indent="0">
+              <a:buNone/>
+            </a:pPr>
+            <a:r>
+              <a:rPr kumimoji="0" lang="en-GB" sz="2000" i="0" u="none" strike="noStrike" kern="1200" cap="none" spc="0" normalizeH="0" baseline="0" noProof="0" dirty="0">
+                <a:ln>
+                  <a:noFill/>
+                </a:ln>
+                <a:solidFill>
+                  <a:prstClr val="black"/>
+                </a:solidFill>
+                <a:effectLst/>
+                <a:uLnTx/>
+                <a:uFillTx/>
+                <a:latin typeface="APL385 Unicode" panose="020B0709000202000203" pitchFamily="49" charset="0"/>
+                <a:ea typeface="+mj-ea"/>
+                <a:cs typeface="+mj-cs"/>
+              </a:rPr>
+              <a:t>└~┘</a:t>
+            </a:r>
+          </a:p>
+          <a:p>
+            <a:pPr marL="0" indent="0">
+              <a:buNone/>
+            </a:pPr>
+            <a:r>
+              <a:rPr kumimoji="0" lang="en-GB" sz="2000" i="0" u="none" strike="noStrike" kern="1200" cap="none" spc="0" normalizeH="0" baseline="0" noProof="0" dirty="0">
+                <a:ln>
+                  <a:noFill/>
+                </a:ln>
+                <a:solidFill>
+                  <a:prstClr val="black"/>
+                </a:solidFill>
+                <a:effectLst/>
+                <a:uLnTx/>
+                <a:uFillTx/>
+                <a:latin typeface="APL385 Unicode" panose="020B0709000202000203" pitchFamily="49" charset="0"/>
+                <a:ea typeface="+mj-ea"/>
+                <a:cs typeface="+mj-cs"/>
+              </a:rPr>
+              <a:t>      ]display </a:t>
+            </a:r>
+            <a:r>
+              <a:rPr kumimoji="0" lang="en-GB" sz="2000" i="0" u="none" strike="noStrike" kern="1200" cap="none" spc="0" normalizeH="0" baseline="0" noProof="0" dirty="0" err="1">
+                <a:ln>
+                  <a:noFill/>
+                </a:ln>
+                <a:solidFill>
+                  <a:prstClr val="black"/>
+                </a:solidFill>
+                <a:effectLst/>
+                <a:uLnTx/>
+                <a:uFillTx/>
+                <a:latin typeface="APL385 Unicode" panose="020B0709000202000203" pitchFamily="49" charset="0"/>
+                <a:ea typeface="+mj-ea"/>
+                <a:cs typeface="+mj-cs"/>
+              </a:rPr>
+              <a:t>NumLists</a:t>
+            </a:r>
+            <a:r>
+              <a:rPr kumimoji="0" lang="en-GB" sz="2000" i="0" u="none" strike="noStrike" kern="1200" cap="none" spc="0" normalizeH="0" baseline="0" noProof="0" dirty="0">
                 <a:ln>
                   <a:noFill/>
                 </a:ln>
@@ -9990,7 +10137,7 @@
               <a:buNone/>
             </a:pPr>
             <a:r>
-              <a:rPr kumimoji="0" lang="en-GB" sz="2400" i="0" u="none" strike="noStrike" kern="1200" cap="none" spc="0" normalizeH="0" baseline="0" noProof="0" dirty="0">
+              <a:rPr kumimoji="0" lang="en-GB" sz="2000" i="0" u="none" strike="noStrike" kern="1200" cap="none" spc="0" normalizeH="0" baseline="0" noProof="0" dirty="0">
                 <a:ln>
                   <a:noFill/>
                 </a:ln>
@@ -10012,7 +10159,7 @@
               <a:buNone/>
             </a:pPr>
             <a:r>
-              <a:rPr kumimoji="0" lang="en-GB" sz="2400" i="0" u="none" strike="noStrike" kern="1200" cap="none" spc="0" normalizeH="0" baseline="0" noProof="0" dirty="0">
+              <a:rPr kumimoji="0" lang="en-GB" sz="2000" i="0" u="none" strike="noStrike" kern="1200" cap="none" spc="0" normalizeH="0" baseline="0" noProof="0" dirty="0">
                 <a:ln>
                   <a:noFill/>
                 </a:ln>
@@ -10034,7 +10181,7 @@
               <a:buNone/>
             </a:pPr>
             <a:r>
-              <a:rPr kumimoji="0" lang="en-GB" sz="2400" i="0" u="none" strike="noStrike" kern="1200" cap="none" spc="0" normalizeH="0" baseline="0" noProof="0" dirty="0">
+              <a:rPr kumimoji="0" lang="en-GB" sz="2000" i="0" u="none" strike="noStrike" kern="1200" cap="none" spc="0" normalizeH="0" baseline="0" noProof="0" dirty="0">
                 <a:ln>
                   <a:noFill/>
                 </a:ln>
@@ -10056,7 +10203,7 @@
               <a:buNone/>
             </a:pPr>
             <a:r>
-              <a:rPr kumimoji="0" lang="en-GB" sz="2400" i="0" u="none" strike="noStrike" kern="1200" cap="none" spc="0" normalizeH="0" baseline="0" noProof="0" dirty="0">
+              <a:rPr kumimoji="0" lang="en-GB" sz="2000" i="0" u="none" strike="noStrike" kern="1200" cap="none" spc="0" normalizeH="0" baseline="0" noProof="0" dirty="0">
                 <a:ln>
                   <a:noFill/>
                 </a:ln>
@@ -10078,7 +10225,7 @@
               <a:buNone/>
             </a:pPr>
             <a:r>
-              <a:rPr kumimoji="0" lang="en-GB" sz="2400" i="0" u="none" strike="noStrike" kern="1200" cap="none" spc="0" normalizeH="0" baseline="0" noProof="0" dirty="0">
+              <a:rPr kumimoji="0" lang="en-GB" sz="2000" i="0" u="none" strike="noStrike" kern="1200" cap="none" spc="0" normalizeH="0" baseline="0" noProof="0" dirty="0">
                 <a:ln>
                   <a:noFill/>
                 </a:ln>

</xml_diff>